<commit_message>
Updated poster + excel
</commit_message>
<xml_diff>
--- a/Poster/Poster_herwerking_Conclusie.pptx
+++ b/Poster/Poster_herwerking_Conclusie.pptx
@@ -4909,7 +4909,7 @@
         <p:spPr>
           <a:xfrm>
             <a:off x="1724984" y="4426857"/>
-            <a:ext cx="11700000" cy="9987349"/>
+            <a:ext cx="11700000" cy="9433352"/>
           </a:xfrm>
           <a:prstGeom prst="rect">
             <a:avLst/>
@@ -4946,7 +4946,87 @@
                 <a:ea typeface="Avenir Next" charset="0"/>
                 <a:cs typeface="Avenir Next" charset="0"/>
               </a:rPr>
-              <a:t>Sorteernetwerken zorgen voor een klassiek formeel model voor de 	presentatie van enkele sorteer-algoritmen. </a:t>
+              <a:t>Sorteernetwerken </a:t>
+            </a:r>
+            <a:r>
+              <a:rPr lang="nl-NL" sz="3600" dirty="0" smtClean="0">
+                <a:latin typeface="Avenir Next" charset="0"/>
+                <a:ea typeface="Avenir Next" charset="0"/>
+                <a:cs typeface="Avenir Next" charset="0"/>
+              </a:rPr>
+              <a:t>zijn formele modellen </a:t>
+            </a:r>
+            <a:r>
+              <a:rPr lang="nl-NL" sz="3600" dirty="0" smtClean="0">
+                <a:latin typeface="Avenir Next" charset="0"/>
+                <a:ea typeface="Avenir Next" charset="0"/>
+                <a:cs typeface="Avenir Next" charset="0"/>
+              </a:rPr>
+              <a:t>voor </a:t>
+            </a:r>
+            <a:r>
+              <a:rPr lang="nl-NL" sz="3600" dirty="0" smtClean="0">
+                <a:latin typeface="Avenir Next" charset="0"/>
+                <a:ea typeface="Avenir Next" charset="0"/>
+                <a:cs typeface="Avenir Next" charset="0"/>
+              </a:rPr>
+              <a:t>sorteer-algoritmen zoals </a:t>
+            </a:r>
+            <a:r>
+              <a:rPr lang="nl-NL" sz="3600" i="1" dirty="0" smtClean="0">
+                <a:latin typeface="Avenir Next" charset="0"/>
+                <a:ea typeface="Avenir Next" charset="0"/>
+                <a:cs typeface="Avenir Next" charset="0"/>
+              </a:rPr>
+              <a:t>Bubble Sort</a:t>
+            </a:r>
+            <a:r>
+              <a:rPr lang="nl-NL" sz="3600" dirty="0" smtClean="0">
+                <a:latin typeface="Avenir Next" charset="0"/>
+                <a:ea typeface="Avenir Next" charset="0"/>
+                <a:cs typeface="Avenir Next" charset="0"/>
+              </a:rPr>
+              <a:t>, </a:t>
+            </a:r>
+            <a:r>
+              <a:rPr lang="nl-NL" sz="3600" i="1" dirty="0" smtClean="0">
+                <a:latin typeface="Avenir Next" charset="0"/>
+                <a:ea typeface="Avenir Next" charset="0"/>
+                <a:cs typeface="Avenir Next" charset="0"/>
+              </a:rPr>
+              <a:t>Insertion Sort</a:t>
+            </a:r>
+            <a:r>
+              <a:rPr lang="nl-NL" sz="3600" i="1" dirty="0">
+                <a:latin typeface="Avenir Next" charset="0"/>
+                <a:ea typeface="Avenir Next" charset="0"/>
+                <a:cs typeface="Avenir Next" charset="0"/>
+              </a:rPr>
+              <a:t> </a:t>
+            </a:r>
+            <a:r>
+              <a:rPr lang="nl-NL" sz="3600" dirty="0" smtClean="0">
+                <a:latin typeface="Avenir Next" charset="0"/>
+                <a:ea typeface="Avenir Next" charset="0"/>
+                <a:cs typeface="Avenir Next" charset="0"/>
+              </a:rPr>
+              <a:t>en </a:t>
+            </a:r>
+            <a:r>
+              <a:rPr lang="nl-NL" sz="3600" i="1" dirty="0" smtClean="0">
+                <a:latin typeface="Avenir Next" charset="0"/>
+                <a:ea typeface="Avenir Next" charset="0"/>
+                <a:cs typeface="Avenir Next" charset="0"/>
+              </a:rPr>
+              <a:t>Bitonic Sort</a:t>
+            </a:r>
+            <a:r>
+              <a:rPr lang="nl-NL" sz="3600" dirty="0" smtClean="0">
+                <a:latin typeface="Avenir Next" charset="0"/>
+                <a:ea typeface="Avenir Next" charset="0"/>
+                <a:cs typeface="Avenir Next" charset="0"/>
+              </a:rPr>
+              <a:t>. </a:t>
             </a:r>
             <a:r>
               <a:rPr lang="nl-NL" sz="3600" dirty="0">
@@ -4962,23 +5042,7 @@
                 <a:ea typeface="Avenir Next" charset="0"/>
                 <a:cs typeface="Avenir Next" charset="0"/>
               </a:rPr>
-              <a:t>nderzoek naar deze sorteernetwerken </a:t>
-            </a:r>
-            <a:r>
-              <a:rPr lang="nl-NL" sz="3600" dirty="0" smtClean="0">
-                <a:latin typeface="Avenir Next" charset="0"/>
-                <a:ea typeface="Avenir Next" charset="0"/>
-                <a:cs typeface="Avenir Next" charset="0"/>
-              </a:rPr>
-              <a:t>kan </a:t>
-            </a:r>
-            <a:r>
-              <a:rPr lang="nl-NL" sz="3600" dirty="0" smtClean="0">
-                <a:latin typeface="Avenir Next" charset="0"/>
-                <a:ea typeface="Avenir Next" charset="0"/>
-                <a:cs typeface="Avenir Next" charset="0"/>
-              </a:rPr>
-              <a:t>tot mogelijke inzichten leiden. Zo hebben Codish </a:t>
+              <a:t>nderzoek naar deze sorteernetwerken kan tot mogelijke inzichten leiden. Zo hebben Codish </a:t>
             </a:r>
             <a:r>
               <a:rPr lang="nl-NL" sz="3600" i="1" dirty="0" smtClean="0">
@@ -5177,15 +5241,7 @@
                 <a:ea typeface="Avenir Next" charset="0"/>
                 <a:cs typeface="Avenir Next" charset="0"/>
               </a:rPr>
-              <a:t>Een comparator netwerk </a:t>
-            </a:r>
-            <a:r>
-              <a:rPr lang="nl-NL" sz="3600" dirty="0" smtClean="0">
-                <a:latin typeface="Avenir Next" charset="0"/>
-                <a:ea typeface="Avenir Next" charset="0"/>
-                <a:cs typeface="Avenir Next" charset="0"/>
-              </a:rPr>
-              <a:t>geeft een partieel gesorteerde permutatie van de input terug.</a:t>
+              <a:t>Een comparator netwerk geeft een partieel gesorteerde permutatie van de input terug.</a:t>
             </a:r>
           </a:p>
           <a:p>
@@ -5214,11 +5270,6 @@
               </a:rPr>
               <a:t>Een comparator netwerk bevat</a:t>
             </a:r>
-            <a:endParaRPr lang="nl-NL" sz="3600" dirty="0" smtClean="0">
-              <a:latin typeface="Avenir Next" charset="0"/>
-              <a:ea typeface="Avenir Next" charset="0"/>
-              <a:cs typeface="Avenir Next" charset="0"/>
-            </a:endParaRPr>
           </a:p>
           <a:p>
             <a:pPr marL="571500" indent="-571500" algn="just">
@@ -5239,21 +5290,8 @@
                 <a:ea typeface="Avenir Next" charset="0"/>
                 <a:cs typeface="Avenir Next" charset="0"/>
               </a:rPr>
-              <a:t> </a:t>
-            </a:r>
-            <a:r>
-              <a:rPr lang="nl-NL" sz="3600" dirty="0" smtClean="0">
-                <a:latin typeface="Avenir Next" charset="0"/>
-                <a:ea typeface="Avenir Next" charset="0"/>
-                <a:cs typeface="Avenir Next" charset="0"/>
-              </a:rPr>
-              <a:t>kanalen;</a:t>
-            </a:r>
-            <a:endParaRPr lang="nl-NL" sz="3600" dirty="0" smtClean="0">
-              <a:latin typeface="Avenir Next" charset="0"/>
-              <a:ea typeface="Avenir Next" charset="0"/>
-              <a:cs typeface="Avenir Next" charset="0"/>
-            </a:endParaRPr>
+              <a:t> kanalen;</a:t>
+            </a:r>
           </a:p>
           <a:p>
             <a:pPr marL="571500" indent="-571500" algn="just">
@@ -5274,21 +5312,8 @@
                 <a:ea typeface="Avenir Next" charset="0"/>
                 <a:cs typeface="Avenir Next" charset="0"/>
               </a:rPr>
-              <a:t> </a:t>
-            </a:r>
-            <a:r>
-              <a:rPr lang="nl-NL" sz="3600" dirty="0" smtClean="0">
-                <a:latin typeface="Avenir Next" charset="0"/>
-                <a:ea typeface="Avenir Next" charset="0"/>
-                <a:cs typeface="Avenir Next" charset="0"/>
-              </a:rPr>
-              <a:t>comparatoren.</a:t>
-            </a:r>
-            <a:endParaRPr lang="nl-NL" sz="3600" dirty="0" smtClean="0">
-              <a:latin typeface="Avenir Next" charset="0"/>
-              <a:ea typeface="Avenir Next" charset="0"/>
-              <a:cs typeface="Avenir Next" charset="0"/>
-            </a:endParaRPr>
+              <a:t> comparatoren.</a:t>
+            </a:r>
           </a:p>
           <a:p>
             <a:pPr algn="just"/>
@@ -5447,23 +5472,7 @@
                 <a:ea typeface="Avenir Next" charset="0"/>
                 <a:cs typeface="Avenir Next" charset="0"/>
               </a:rPr>
-              <a:t>Een comparator neemt de input verkregen door twee verbonden kanalen en geeft de waarden in </a:t>
-            </a:r>
-            <a:r>
-              <a:rPr lang="nl-NL" sz="3600" dirty="0" smtClean="0">
-                <a:latin typeface="Avenir Next" charset="0"/>
-                <a:ea typeface="Avenir Next" charset="0"/>
-                <a:cs typeface="Avenir Next" charset="0"/>
-              </a:rPr>
-              <a:t>gesorteerde </a:t>
-            </a:r>
-            <a:r>
-              <a:rPr lang="nl-NL" sz="3600" dirty="0" smtClean="0">
-                <a:latin typeface="Avenir Next" charset="0"/>
-                <a:ea typeface="Avenir Next" charset="0"/>
-                <a:cs typeface="Avenir Next" charset="0"/>
-              </a:rPr>
-              <a:t>volgorde terug.</a:t>
+              <a:t>Een comparator neemt de input verkregen door twee verbonden kanalen en geeft de waarden in gesorteerde volgorde terug.</a:t>
             </a:r>
           </a:p>
           <a:p>
@@ -5671,11 +5680,6 @@
               </a:rPr>
               <a:t>Genereer door elk netwerk uit te breiden met alle mogelijke comparatoren. </a:t>
             </a:r>
-            <a:endParaRPr lang="nl-BE" sz="3600" dirty="0" smtClean="0">
-              <a:latin typeface="Avenir Next" charset="0"/>
-              <a:ea typeface="Avenir Next" charset="0"/>
-              <a:cs typeface="Avenir Next" charset="0"/>
-            </a:endParaRPr>
           </a:p>
           <a:p>
             <a:pPr algn="just"/>
@@ -5685,31 +5689,7 @@
                 <a:ea typeface="Avenir Next" charset="0"/>
                 <a:cs typeface="Avenir Next" charset="0"/>
               </a:rPr>
-              <a:t>Snoei </a:t>
-            </a:r>
-            <a:r>
-              <a:rPr lang="nl-BE" sz="3600" dirty="0" smtClean="0">
-                <a:latin typeface="Avenir Next" charset="0"/>
-                <a:ea typeface="Avenir Next" charset="0"/>
-                <a:cs typeface="Avenir Next" charset="0"/>
-              </a:rPr>
-              <a:t>door overbodige netwerken te </a:t>
-            </a:r>
-            <a:r>
-              <a:rPr lang="nl-BE" sz="3600" dirty="0" smtClean="0">
-                <a:latin typeface="Avenir Next" charset="0"/>
-                <a:ea typeface="Avenir Next" charset="0"/>
-                <a:cs typeface="Avenir Next" charset="0"/>
-              </a:rPr>
-              <a:t>verwijderen. Herhaal </a:t>
-            </a:r>
-            <a:r>
-              <a:rPr lang="nl-BE" sz="3600" dirty="0" smtClean="0">
-                <a:latin typeface="Avenir Next" charset="0"/>
-                <a:ea typeface="Avenir Next" charset="0"/>
-                <a:cs typeface="Avenir Next" charset="0"/>
-              </a:rPr>
-              <a:t>deze cyclus tot er één netwerk overblijft.</a:t>
+              <a:t>Snoei door overbodige netwerken te verwijderen. Herhaal deze cyclus tot er één netwerk overblijft.</a:t>
             </a:r>
             <a:endParaRPr lang="nl-NL" sz="3600" dirty="0" smtClean="0">
               <a:latin typeface="Avenir Next" charset="0"/>
@@ -6000,15 +5980,7 @@
                 <a:ea typeface="Avenir Next" charset="0"/>
                 <a:cs typeface="Avenir Next" charset="0"/>
               </a:rPr>
-              <a:t>verlagen.  Dit zorgde voor een aanzienlijke verbetering</a:t>
-            </a:r>
-            <a:r>
-              <a:rPr lang="nl-NL" sz="3600" dirty="0" smtClean="0">
-                <a:latin typeface="Avenir Next" charset="0"/>
-                <a:ea typeface="Avenir Next" charset="0"/>
-                <a:cs typeface="Avenir Next" charset="0"/>
-              </a:rPr>
-              <a:t>.</a:t>
+              <a:t>verlagen.  Dit zorgde voor een aanzienlijke verbetering.</a:t>
             </a:r>
             <a:endParaRPr lang="nl-NL" sz="3600" dirty="0">
               <a:latin typeface="Avenir Next" charset="0"/>
@@ -6300,7 +6272,15 @@
                 <a:ea typeface="Avenir Next" charset="0"/>
                 <a:cs typeface="Avenir Next" charset="0"/>
               </a:rPr>
-              <a:t>Twenty</a:t>
+              <a:t>Twenty-Nine</a:t>
+            </a:r>
+            <a:r>
+              <a:rPr lang="nl-NL" sz="3600" i="1" dirty="0" smtClean="0">
+                <a:latin typeface="Avenir Next" charset="0"/>
+                <a:ea typeface="Avenir Next" charset="0"/>
+                <a:cs typeface="Avenir Next" charset="0"/>
+              </a:rPr>
+              <a:t> </a:t>
             </a:r>
             <a:r>
               <a:rPr lang="nl-NL" sz="3600" i="1" dirty="0" err="1" smtClean="0">
@@ -6308,7 +6288,7 @@
                 <a:ea typeface="Avenir Next" charset="0"/>
                 <a:cs typeface="Avenir Next" charset="0"/>
               </a:rPr>
-              <a:t>-Nine</a:t>
+              <a:t>for</a:t>
             </a:r>
             <a:r>
               <a:rPr lang="nl-NL" sz="3600" i="1" dirty="0" smtClean="0">
@@ -6316,22 +6296,6 @@
                 <a:ea typeface="Avenir Next" charset="0"/>
                 <a:cs typeface="Avenir Next" charset="0"/>
               </a:rPr>
-              <a:t> </a:t>
-            </a:r>
-            <a:r>
-              <a:rPr lang="nl-NL" sz="3600" i="1" dirty="0" err="1" smtClean="0">
-                <a:latin typeface="Avenir Next" charset="0"/>
-                <a:ea typeface="Avenir Next" charset="0"/>
-                <a:cs typeface="Avenir Next" charset="0"/>
-              </a:rPr>
-              <a:t>for</a:t>
-            </a:r>
-            <a:r>
-              <a:rPr lang="nl-NL" sz="3600" i="1" dirty="0" smtClean="0">
-                <a:latin typeface="Avenir Next" charset="0"/>
-                <a:ea typeface="Avenir Next" charset="0"/>
-                <a:cs typeface="Avenir Next" charset="0"/>
-              </a:rPr>
               <a:t> Ten)</a:t>
             </a:r>
             <a:r>
@@ -6401,11 +6365,6 @@
               </a:rPr>
               <a:t> P. Schneider—Kamp, 24 Juni 2014</a:t>
             </a:r>
-            <a:endParaRPr lang="nl-NL" sz="3600" dirty="0" smtClean="0">
-              <a:latin typeface="Avenir Next" charset="0"/>
-              <a:ea typeface="Avenir Next" charset="0"/>
-              <a:cs typeface="Avenir Next" charset="0"/>
-            </a:endParaRPr>
           </a:p>
         </p:txBody>
       </p:sp>
@@ -6938,7 +6897,7 @@
         <p:nvPicPr>
           <p:cNvPr id="44" name="Afbeelding 43"/>
           <p:cNvPicPr>
-            <a:picLocks noChangeAspect="1"/>
+            <a:picLocks/>
           </p:cNvPicPr>
           <p:nvPr/>
         </p:nvPicPr>
@@ -6957,7 +6916,7 @@
         <p:spPr>
           <a:xfrm>
             <a:off x="16819591" y="27353624"/>
-            <a:ext cx="10800000" cy="5778438"/>
+            <a:ext cx="10800000" cy="5760000"/>
           </a:xfrm>
           <a:prstGeom prst="rect">
             <a:avLst/>
@@ -6968,7 +6927,7 @@
         <p:nvPicPr>
           <p:cNvPr id="45" name="Afbeelding 44"/>
           <p:cNvPicPr>
-            <a:picLocks noChangeAspect="1"/>
+            <a:picLocks/>
           </p:cNvPicPr>
           <p:nvPr/>
         </p:nvPicPr>
@@ -6986,8 +6945,8 @@
         </p:blipFill>
         <p:spPr>
           <a:xfrm>
-            <a:off x="16802322" y="21230672"/>
-            <a:ext cx="10808196" cy="6120000"/>
+            <a:off x="16822111" y="21517797"/>
+            <a:ext cx="10800000" cy="5760000"/>
           </a:xfrm>
           <a:prstGeom prst="rect">
             <a:avLst/>
@@ -7126,6 +7085,93 @@
           </a:prstGeom>
         </p:spPr>
       </p:pic>
+      <p:sp>
+        <p:nvSpPr>
+          <p:cNvPr id="61" name="Vrije vorm 60"/>
+          <p:cNvSpPr/>
+          <p:nvPr/>
+        </p:nvSpPr>
+        <p:spPr>
+          <a:xfrm>
+            <a:off x="20650200" y="26860500"/>
+            <a:ext cx="6032500" cy="3848100"/>
+          </a:xfrm>
+          <a:custGeom>
+            <a:avLst/>
+            <a:gdLst>
+              <a:gd name="connsiteX0" fmla="*/ 6032500 w 6032500"/>
+              <a:gd name="connsiteY0" fmla="*/ 0 h 3848100"/>
+              <a:gd name="connsiteX1" fmla="*/ 6032500 w 6032500"/>
+              <a:gd name="connsiteY1" fmla="*/ 1206500 h 3848100"/>
+              <a:gd name="connsiteX2" fmla="*/ 0 w 6032500"/>
+              <a:gd name="connsiteY2" fmla="*/ 1206500 h 3848100"/>
+              <a:gd name="connsiteX3" fmla="*/ 0 w 6032500"/>
+              <a:gd name="connsiteY3" fmla="*/ 3848100 h 3848100"/>
+            </a:gdLst>
+            <a:ahLst/>
+            <a:cxnLst>
+              <a:cxn ang="0">
+                <a:pos x="connsiteX0" y="connsiteY0"/>
+              </a:cxn>
+              <a:cxn ang="0">
+                <a:pos x="connsiteX1" y="connsiteY1"/>
+              </a:cxn>
+              <a:cxn ang="0">
+                <a:pos x="connsiteX2" y="connsiteY2"/>
+              </a:cxn>
+              <a:cxn ang="0">
+                <a:pos x="connsiteX3" y="connsiteY3"/>
+              </a:cxn>
+            </a:cxnLst>
+            <a:rect l="l" t="t" r="r" b="b"/>
+            <a:pathLst>
+              <a:path w="6032500" h="3848100">
+                <a:moveTo>
+                  <a:pt x="6032500" y="0"/>
+                </a:moveTo>
+                <a:lnTo>
+                  <a:pt x="6032500" y="1206500"/>
+                </a:lnTo>
+                <a:lnTo>
+                  <a:pt x="0" y="1206500"/>
+                </a:lnTo>
+                <a:lnTo>
+                  <a:pt x="0" y="3848100"/>
+                </a:lnTo>
+              </a:path>
+            </a:pathLst>
+          </a:custGeom>
+          <a:noFill/>
+          <a:ln w="88900">
+            <a:solidFill>
+              <a:srgbClr val="003F77"/>
+            </a:solidFill>
+            <a:tailEnd type="triangle"/>
+          </a:ln>
+        </p:spPr>
+        <p:style>
+          <a:lnRef idx="2">
+            <a:schemeClr val="dk1"/>
+          </a:lnRef>
+          <a:fillRef idx="0">
+            <a:schemeClr val="dk1"/>
+          </a:fillRef>
+          <a:effectRef idx="1">
+            <a:schemeClr val="dk1"/>
+          </a:effectRef>
+          <a:fontRef idx="minor">
+            <a:schemeClr val="tx1"/>
+          </a:fontRef>
+        </p:style>
+        <p:txBody>
+          <a:bodyPr rtlCol="0" anchor="ctr"/>
+          <a:lstStyle/>
+          <a:p>
+            <a:pPr algn="ctr"/>
+            <a:endParaRPr lang="nl-NL"/>
+          </a:p>
+        </p:txBody>
+      </p:sp>
     </p:spTree>
   </p:cSld>
   <p:clrMapOvr>

</xml_diff>